<commit_message>
Small update to ppt.
</commit_message>
<xml_diff>
--- a/presentation/gtb_prenetation.pptx
+++ b/presentation/gtb_prenetation.pptx
@@ -3698,10 +3698,15 @@
             <p:ph type="subTitle" idx="1"/>
           </p:nvPr>
         </p:nvSpPr>
-        <p:spPr/>
+        <p:spPr>
+          <a:xfrm>
+            <a:off x="1322921" y="3138420"/>
+            <a:ext cx="6498159" cy="916641"/>
+          </a:xfrm>
+        </p:spPr>
         <p:txBody>
           <a:bodyPr>
-            <a:normAutofit fontScale="77500" lnSpcReduction="20000"/>
+            <a:noAutofit/>
           </a:bodyPr>
           <a:lstStyle/>
           <a:p>
@@ -3749,6 +3754,13 @@
   <p:clrMapOvr>
     <a:masterClrMapping/>
   </p:clrMapOvr>
+  <p:timing>
+    <p:tnLst>
+      <p:par>
+        <p:cTn xmlns:p14="http://schemas.microsoft.com/office/powerpoint/2010/main" id="1" dur="indefinite" restart="never" nodeType="tmRoot"/>
+      </p:par>
+    </p:tnLst>
+  </p:timing>
 </p:sld>
 </file>
 
@@ -3838,6 +3850,13 @@
   <p:clrMapOvr>
     <a:masterClrMapping/>
   </p:clrMapOvr>
+  <p:timing>
+    <p:tnLst>
+      <p:par>
+        <p:cTn xmlns:p14="http://schemas.microsoft.com/office/powerpoint/2010/main" id="1" dur="indefinite" restart="never" nodeType="tmRoot"/>
+      </p:par>
+    </p:tnLst>
+  </p:timing>
 </p:sld>
 </file>
 
@@ -3927,6 +3946,13 @@
   <p:clrMapOvr>
     <a:masterClrMapping/>
   </p:clrMapOvr>
+  <p:timing>
+    <p:tnLst>
+      <p:par>
+        <p:cTn xmlns:p14="http://schemas.microsoft.com/office/powerpoint/2010/main" id="1" dur="indefinite" restart="never" nodeType="tmRoot"/>
+      </p:par>
+    </p:tnLst>
+  </p:timing>
 </p:sld>
 </file>
 

</xml_diff>